<commit_message>
Removed Unecessary Files and Updated Slide
</commit_message>
<xml_diff>
--- a/BasicCSharpNoProfile.pptx
+++ b/BasicCSharpNoProfile.pptx
@@ -200,7 +200,7 @@
           <a:noFill/>
           <a:extLst>
             <a:ext uri="{909E8E84-426E-40dd-AFC4-6F175D3DCCD1}">
-              <a14:hiddenFill xmlns:a14="http://schemas.microsoft.com/office/drawing/2010/main" xmlns="">
+              <a14:hiddenFill xmlns="" xmlns:a14="http://schemas.microsoft.com/office/drawing/2010/main">
                 <a:solidFill>
                   <a:srgbClr val="FFFFFF"/>
                 </a:solidFill>
@@ -259,7 +259,7 @@
             </a:ln>
             <a:extLst>
               <a:ext uri="{91240B29-F687-4f45-9708-019B960494DF}">
-                <a14:hiddenLine xmlns:a14="http://schemas.microsoft.com/office/drawing/2010/main" xmlns="" w="9525">
+                <a14:hiddenLine xmlns="" xmlns:a14="http://schemas.microsoft.com/office/drawing/2010/main" w="9525">
                   <a:solidFill>
                     <a:srgbClr val="000000"/>
                   </a:solidFill>
@@ -349,7 +349,7 @@
             </a:ln>
             <a:extLst>
               <a:ext uri="{91240B29-F687-4f45-9708-019B960494DF}">
-                <a14:hiddenLine xmlns:a14="http://schemas.microsoft.com/office/drawing/2010/main" xmlns="" w="9525">
+                <a14:hiddenLine xmlns="" xmlns:a14="http://schemas.microsoft.com/office/drawing/2010/main" w="9525">
                   <a:solidFill>
                     <a:srgbClr val="000000"/>
                   </a:solidFill>
@@ -439,7 +439,7 @@
             </a:ln>
             <a:extLst>
               <a:ext uri="{91240B29-F687-4f45-9708-019B960494DF}">
-                <a14:hiddenLine xmlns:a14="http://schemas.microsoft.com/office/drawing/2010/main" xmlns="" w="9525">
+                <a14:hiddenLine xmlns="" xmlns:a14="http://schemas.microsoft.com/office/drawing/2010/main" w="9525">
                   <a:solidFill>
                     <a:srgbClr val="000000"/>
                   </a:solidFill>
@@ -473,7 +473,7 @@
             </a:ln>
             <a:extLst>
               <a:ext uri="{91240B29-F687-4f45-9708-019B960494DF}">
-                <a14:hiddenLine xmlns:a14="http://schemas.microsoft.com/office/drawing/2010/main" xmlns="" w="9525">
+                <a14:hiddenLine xmlns="" xmlns:a14="http://schemas.microsoft.com/office/drawing/2010/main" w="9525">
                   <a:solidFill>
                     <a:srgbClr val="000000"/>
                   </a:solidFill>
@@ -563,7 +563,7 @@
             </a:ln>
             <a:extLst>
               <a:ext uri="{91240B29-F687-4f45-9708-019B960494DF}">
-                <a14:hiddenLine xmlns:a14="http://schemas.microsoft.com/office/drawing/2010/main" xmlns="" w="9525">
+                <a14:hiddenLine xmlns="" xmlns:a14="http://schemas.microsoft.com/office/drawing/2010/main" w="9525">
                   <a:solidFill>
                     <a:srgbClr val="000000"/>
                   </a:solidFill>
@@ -625,7 +625,7 @@
             </a:ln>
             <a:extLst>
               <a:ext uri="{91240B29-F687-4f45-9708-019B960494DF}">
-                <a14:hiddenLine xmlns:a14="http://schemas.microsoft.com/office/drawing/2010/main" xmlns="" w="9525">
+                <a14:hiddenLine xmlns="" xmlns:a14="http://schemas.microsoft.com/office/drawing/2010/main" w="9525">
                   <a:solidFill>
                     <a:srgbClr val="000000"/>
                   </a:solidFill>
@@ -687,7 +687,7 @@
             </a:ln>
             <a:extLst>
               <a:ext uri="{91240B29-F687-4f45-9708-019B960494DF}">
-                <a14:hiddenLine xmlns:a14="http://schemas.microsoft.com/office/drawing/2010/main" xmlns="" w="9525">
+                <a14:hiddenLine xmlns="" xmlns:a14="http://schemas.microsoft.com/office/drawing/2010/main" w="9525">
                   <a:solidFill>
                     <a:srgbClr val="000000"/>
                   </a:solidFill>
@@ -777,7 +777,7 @@
             </a:ln>
             <a:extLst>
               <a:ext uri="{91240B29-F687-4f45-9708-019B960494DF}">
-                <a14:hiddenLine xmlns:a14="http://schemas.microsoft.com/office/drawing/2010/main" xmlns="" w="9525">
+                <a14:hiddenLine xmlns="" xmlns:a14="http://schemas.microsoft.com/office/drawing/2010/main" w="9525">
                   <a:solidFill>
                     <a:srgbClr val="000000"/>
                   </a:solidFill>
@@ -839,7 +839,7 @@
             </a:ln>
             <a:extLst>
               <a:ext uri="{91240B29-F687-4f45-9708-019B960494DF}">
-                <a14:hiddenLine xmlns:a14="http://schemas.microsoft.com/office/drawing/2010/main" xmlns="" w="9525">
+                <a14:hiddenLine xmlns="" xmlns:a14="http://schemas.microsoft.com/office/drawing/2010/main" w="9525">
                   <a:solidFill>
                     <a:srgbClr val="000000"/>
                   </a:solidFill>
@@ -901,7 +901,7 @@
             </a:ln>
             <a:extLst>
               <a:ext uri="{91240B29-F687-4f45-9708-019B960494DF}">
-                <a14:hiddenLine xmlns:a14="http://schemas.microsoft.com/office/drawing/2010/main" xmlns="" w="9525">
+                <a14:hiddenLine xmlns="" xmlns:a14="http://schemas.microsoft.com/office/drawing/2010/main" w="9525">
                   <a:solidFill>
                     <a:srgbClr val="000000"/>
                   </a:solidFill>
@@ -991,7 +991,7 @@
             </a:ln>
             <a:extLst>
               <a:ext uri="{91240B29-F687-4f45-9708-019B960494DF}">
-                <a14:hiddenLine xmlns:a14="http://schemas.microsoft.com/office/drawing/2010/main" xmlns="" w="9525">
+                <a14:hiddenLine xmlns="" xmlns:a14="http://schemas.microsoft.com/office/drawing/2010/main" w="9525">
                   <a:solidFill>
                     <a:srgbClr val="000000"/>
                   </a:solidFill>
@@ -1081,7 +1081,7 @@
             </a:ln>
             <a:extLst>
               <a:ext uri="{91240B29-F687-4f45-9708-019B960494DF}">
-                <a14:hiddenLine xmlns:a14="http://schemas.microsoft.com/office/drawing/2010/main" xmlns="" w="9525">
+                <a14:hiddenLine xmlns="" xmlns:a14="http://schemas.microsoft.com/office/drawing/2010/main" w="9525">
                   <a:solidFill>
                     <a:srgbClr val="000000"/>
                   </a:solidFill>
@@ -1143,7 +1143,7 @@
             </a:ln>
             <a:extLst>
               <a:ext uri="{91240B29-F687-4f45-9708-019B960494DF}">
-                <a14:hiddenLine xmlns:a14="http://schemas.microsoft.com/office/drawing/2010/main" xmlns="" w="9525">
+                <a14:hiddenLine xmlns="" xmlns:a14="http://schemas.microsoft.com/office/drawing/2010/main" w="9525">
                   <a:solidFill>
                     <a:srgbClr val="000000"/>
                   </a:solidFill>
@@ -1253,7 +1253,7 @@
             </a:ln>
             <a:extLst>
               <a:ext uri="{91240B29-F687-4f45-9708-019B960494DF}">
-                <a14:hiddenLine xmlns:a14="http://schemas.microsoft.com/office/drawing/2010/main" xmlns="" w="9525">
+                <a14:hiddenLine xmlns="" xmlns:a14="http://schemas.microsoft.com/office/drawing/2010/main" w="9525">
                   <a:solidFill>
                     <a:srgbClr val="000000"/>
                   </a:solidFill>
@@ -1315,7 +1315,7 @@
             </a:ln>
             <a:extLst>
               <a:ext uri="{91240B29-F687-4f45-9708-019B960494DF}">
-                <a14:hiddenLine xmlns:a14="http://schemas.microsoft.com/office/drawing/2010/main" xmlns="" w="9525">
+                <a14:hiddenLine xmlns="" xmlns:a14="http://schemas.microsoft.com/office/drawing/2010/main" w="9525">
                   <a:solidFill>
                     <a:srgbClr val="000000"/>
                   </a:solidFill>
@@ -1405,7 +1405,7 @@
             </a:ln>
             <a:extLst>
               <a:ext uri="{91240B29-F687-4f45-9708-019B960494DF}">
-                <a14:hiddenLine xmlns:a14="http://schemas.microsoft.com/office/drawing/2010/main" xmlns="" w="9525">
+                <a14:hiddenLine xmlns="" xmlns:a14="http://schemas.microsoft.com/office/drawing/2010/main" w="9525">
                   <a:solidFill>
                     <a:srgbClr val="000000"/>
                   </a:solidFill>
@@ -1495,7 +1495,7 @@
             </a:ln>
             <a:extLst>
               <a:ext uri="{91240B29-F687-4f45-9708-019B960494DF}">
-                <a14:hiddenLine xmlns:a14="http://schemas.microsoft.com/office/drawing/2010/main" xmlns="" w="9525">
+                <a14:hiddenLine xmlns="" xmlns:a14="http://schemas.microsoft.com/office/drawing/2010/main" w="9525">
                   <a:solidFill>
                     <a:srgbClr val="000000"/>
                   </a:solidFill>
@@ -1557,7 +1557,7 @@
             </a:ln>
             <a:extLst>
               <a:ext uri="{91240B29-F687-4f45-9708-019B960494DF}">
-                <a14:hiddenLine xmlns:a14="http://schemas.microsoft.com/office/drawing/2010/main" xmlns="" w="9525">
+                <a14:hiddenLine xmlns="" xmlns:a14="http://schemas.microsoft.com/office/drawing/2010/main" w="9525">
                   <a:solidFill>
                     <a:srgbClr val="000000"/>
                   </a:solidFill>
@@ -1647,7 +1647,7 @@
             </a:ln>
             <a:extLst>
               <a:ext uri="{91240B29-F687-4f45-9708-019B960494DF}">
-                <a14:hiddenLine xmlns:a14="http://schemas.microsoft.com/office/drawing/2010/main" xmlns="" w="9525">
+                <a14:hiddenLine xmlns="" xmlns:a14="http://schemas.microsoft.com/office/drawing/2010/main" w="9525">
                   <a:solidFill>
                     <a:srgbClr val="000000"/>
                   </a:solidFill>
@@ -1737,7 +1737,7 @@
             </a:ln>
             <a:extLst>
               <a:ext uri="{91240B29-F687-4f45-9708-019B960494DF}">
-                <a14:hiddenLine xmlns:a14="http://schemas.microsoft.com/office/drawing/2010/main" xmlns="" w="9525">
+                <a14:hiddenLine xmlns="" xmlns:a14="http://schemas.microsoft.com/office/drawing/2010/main" w="9525">
                   <a:solidFill>
                     <a:srgbClr val="000000"/>
                   </a:solidFill>
@@ -1793,7 +1793,7 @@
             </a:ln>
             <a:extLst>
               <a:ext uri="{91240B29-F687-4f45-9708-019B960494DF}">
-                <a14:hiddenLine xmlns:a14="http://schemas.microsoft.com/office/drawing/2010/main" xmlns="" w="9525">
+                <a14:hiddenLine xmlns="" xmlns:a14="http://schemas.microsoft.com/office/drawing/2010/main" w="9525">
                   <a:solidFill>
                     <a:srgbClr val="000000"/>
                   </a:solidFill>
@@ -1883,7 +1883,7 @@
             </a:ln>
             <a:extLst>
               <a:ext uri="{91240B29-F687-4f45-9708-019B960494DF}">
-                <a14:hiddenLine xmlns:a14="http://schemas.microsoft.com/office/drawing/2010/main" xmlns="" w="9525">
+                <a14:hiddenLine xmlns="" xmlns:a14="http://schemas.microsoft.com/office/drawing/2010/main" w="9525">
                   <a:solidFill>
                     <a:srgbClr val="000000"/>
                   </a:solidFill>
@@ -1939,7 +1939,7 @@
             </a:ln>
             <a:extLst>
               <a:ext uri="{91240B29-F687-4f45-9708-019B960494DF}">
-                <a14:hiddenLine xmlns:a14="http://schemas.microsoft.com/office/drawing/2010/main" xmlns="" w="9525">
+                <a14:hiddenLine xmlns="" xmlns:a14="http://schemas.microsoft.com/office/drawing/2010/main" w="9525">
                   <a:solidFill>
                     <a:srgbClr val="000000"/>
                   </a:solidFill>
@@ -2029,7 +2029,7 @@
             </a:ln>
             <a:extLst>
               <a:ext uri="{91240B29-F687-4f45-9708-019B960494DF}">
-                <a14:hiddenLine xmlns:a14="http://schemas.microsoft.com/office/drawing/2010/main" xmlns="" w="9525">
+                <a14:hiddenLine xmlns="" xmlns:a14="http://schemas.microsoft.com/office/drawing/2010/main" w="9525">
                   <a:solidFill>
                     <a:srgbClr val="000000"/>
                   </a:solidFill>
@@ -2097,7 +2097,7 @@
             </a:ln>
             <a:extLst>
               <a:ext uri="{91240B29-F687-4f45-9708-019B960494DF}">
-                <a14:hiddenLine xmlns:a14="http://schemas.microsoft.com/office/drawing/2010/main" xmlns="" w="9525">
+                <a14:hiddenLine xmlns="" xmlns:a14="http://schemas.microsoft.com/office/drawing/2010/main" w="9525">
                   <a:solidFill>
                     <a:srgbClr val="000000"/>
                   </a:solidFill>
@@ -2187,7 +2187,7 @@
             </a:ln>
             <a:extLst>
               <a:ext uri="{91240B29-F687-4f45-9708-019B960494DF}">
-                <a14:hiddenLine xmlns:a14="http://schemas.microsoft.com/office/drawing/2010/main" xmlns="" w="9525">
+                <a14:hiddenLine xmlns="" xmlns:a14="http://schemas.microsoft.com/office/drawing/2010/main" w="9525">
                   <a:solidFill>
                     <a:srgbClr val="000000"/>
                   </a:solidFill>
@@ -2255,7 +2255,7 @@
             </a:ln>
             <a:extLst>
               <a:ext uri="{91240B29-F687-4f45-9708-019B960494DF}">
-                <a14:hiddenLine xmlns:a14="http://schemas.microsoft.com/office/drawing/2010/main" xmlns="" w="9525">
+                <a14:hiddenLine xmlns="" xmlns:a14="http://schemas.microsoft.com/office/drawing/2010/main" w="9525">
                   <a:solidFill>
                     <a:srgbClr val="000000"/>
                   </a:solidFill>
@@ -2345,7 +2345,7 @@
             </a:ln>
             <a:extLst>
               <a:ext uri="{91240B29-F687-4f45-9708-019B960494DF}">
-                <a14:hiddenLine xmlns:a14="http://schemas.microsoft.com/office/drawing/2010/main" xmlns="" w="9525">
+                <a14:hiddenLine xmlns="" xmlns:a14="http://schemas.microsoft.com/office/drawing/2010/main" w="9525">
                   <a:solidFill>
                     <a:srgbClr val="000000"/>
                   </a:solidFill>
@@ -2379,7 +2379,7 @@
             </a:ln>
             <a:extLst>
               <a:ext uri="{91240B29-F687-4f45-9708-019B960494DF}">
-                <a14:hiddenLine xmlns:a14="http://schemas.microsoft.com/office/drawing/2010/main" xmlns="" w="9525">
+                <a14:hiddenLine xmlns="" xmlns:a14="http://schemas.microsoft.com/office/drawing/2010/main" w="9525">
                   <a:solidFill>
                     <a:srgbClr val="000000"/>
                   </a:solidFill>
@@ -2469,7 +2469,7 @@
             </a:ln>
             <a:extLst>
               <a:ext uri="{91240B29-F687-4f45-9708-019B960494DF}">
-                <a14:hiddenLine xmlns:a14="http://schemas.microsoft.com/office/drawing/2010/main" xmlns="" w="9525">
+                <a14:hiddenLine xmlns="" xmlns:a14="http://schemas.microsoft.com/office/drawing/2010/main" w="9525">
                   <a:solidFill>
                     <a:srgbClr val="000000"/>
                   </a:solidFill>
@@ -2531,7 +2531,7 @@
             </a:ln>
             <a:extLst>
               <a:ext uri="{91240B29-F687-4f45-9708-019B960494DF}">
-                <a14:hiddenLine xmlns:a14="http://schemas.microsoft.com/office/drawing/2010/main" xmlns="" w="9525">
+                <a14:hiddenLine xmlns="" xmlns:a14="http://schemas.microsoft.com/office/drawing/2010/main" w="9525">
                   <a:solidFill>
                     <a:srgbClr val="000000"/>
                   </a:solidFill>
@@ -2593,7 +2593,7 @@
             </a:ln>
             <a:extLst>
               <a:ext uri="{91240B29-F687-4f45-9708-019B960494DF}">
-                <a14:hiddenLine xmlns:a14="http://schemas.microsoft.com/office/drawing/2010/main" xmlns="" w="9525">
+                <a14:hiddenLine xmlns="" xmlns:a14="http://schemas.microsoft.com/office/drawing/2010/main" w="9525">
                   <a:solidFill>
                     <a:srgbClr val="000000"/>
                   </a:solidFill>
@@ -2683,7 +2683,7 @@
             </a:ln>
             <a:extLst>
               <a:ext uri="{91240B29-F687-4f45-9708-019B960494DF}">
-                <a14:hiddenLine xmlns:a14="http://schemas.microsoft.com/office/drawing/2010/main" xmlns="" w="9525">
+                <a14:hiddenLine xmlns="" xmlns:a14="http://schemas.microsoft.com/office/drawing/2010/main" w="9525">
                   <a:solidFill>
                     <a:srgbClr val="000000"/>
                   </a:solidFill>
@@ -2751,7 +2751,7 @@
             </a:ln>
             <a:extLst>
               <a:ext uri="{91240B29-F687-4f45-9708-019B960494DF}">
-                <a14:hiddenLine xmlns:a14="http://schemas.microsoft.com/office/drawing/2010/main" xmlns="" w="9525">
+                <a14:hiddenLine xmlns="" xmlns:a14="http://schemas.microsoft.com/office/drawing/2010/main" w="9525">
                   <a:solidFill>
                     <a:srgbClr val="000000"/>
                   </a:solidFill>
@@ -2813,7 +2813,7 @@
             </a:ln>
             <a:extLst>
               <a:ext uri="{91240B29-F687-4f45-9708-019B960494DF}">
-                <a14:hiddenLine xmlns:a14="http://schemas.microsoft.com/office/drawing/2010/main" xmlns="" w="9525">
+                <a14:hiddenLine xmlns="" xmlns:a14="http://schemas.microsoft.com/office/drawing/2010/main" w="9525">
                   <a:solidFill>
                     <a:srgbClr val="000000"/>
                   </a:solidFill>
@@ -2903,7 +2903,7 @@
             </a:ln>
             <a:extLst>
               <a:ext uri="{91240B29-F687-4f45-9708-019B960494DF}">
-                <a14:hiddenLine xmlns:a14="http://schemas.microsoft.com/office/drawing/2010/main" xmlns="" w="9525">
+                <a14:hiddenLine xmlns="" xmlns:a14="http://schemas.microsoft.com/office/drawing/2010/main" w="9525">
                   <a:solidFill>
                     <a:srgbClr val="000000"/>
                   </a:solidFill>
@@ -2965,7 +2965,7 @@
             </a:ln>
             <a:extLst>
               <a:ext uri="{91240B29-F687-4f45-9708-019B960494DF}">
-                <a14:hiddenLine xmlns:a14="http://schemas.microsoft.com/office/drawing/2010/main" xmlns="" w="9525">
+                <a14:hiddenLine xmlns="" xmlns:a14="http://schemas.microsoft.com/office/drawing/2010/main" w="9525">
                   <a:solidFill>
                     <a:srgbClr val="000000"/>
                   </a:solidFill>
@@ -3055,7 +3055,7 @@
             </a:ln>
             <a:extLst>
               <a:ext uri="{91240B29-F687-4f45-9708-019B960494DF}">
-                <a14:hiddenLine xmlns:a14="http://schemas.microsoft.com/office/drawing/2010/main" xmlns="" w="9525">
+                <a14:hiddenLine xmlns="" xmlns:a14="http://schemas.microsoft.com/office/drawing/2010/main" w="9525">
                   <a:solidFill>
                     <a:srgbClr val="000000"/>
                   </a:solidFill>
@@ -3117,7 +3117,7 @@
             </a:ln>
             <a:extLst>
               <a:ext uri="{91240B29-F687-4f45-9708-019B960494DF}">
-                <a14:hiddenLine xmlns:a14="http://schemas.microsoft.com/office/drawing/2010/main" xmlns="" w="9525">
+                <a14:hiddenLine xmlns="" xmlns:a14="http://schemas.microsoft.com/office/drawing/2010/main" w="9525">
                   <a:solidFill>
                     <a:srgbClr val="000000"/>
                   </a:solidFill>
@@ -3207,7 +3207,7 @@
             </a:ln>
             <a:extLst>
               <a:ext uri="{91240B29-F687-4f45-9708-019B960494DF}">
-                <a14:hiddenLine xmlns:a14="http://schemas.microsoft.com/office/drawing/2010/main" xmlns="" w="9525">
+                <a14:hiddenLine xmlns="" xmlns:a14="http://schemas.microsoft.com/office/drawing/2010/main" w="9525">
                   <a:solidFill>
                     <a:srgbClr val="000000"/>
                   </a:solidFill>
@@ -3241,7 +3241,7 @@
             </a:ln>
             <a:extLst>
               <a:ext uri="{91240B29-F687-4f45-9708-019B960494DF}">
-                <a14:hiddenLine xmlns:a14="http://schemas.microsoft.com/office/drawing/2010/main" xmlns="" w="9525">
+                <a14:hiddenLine xmlns="" xmlns:a14="http://schemas.microsoft.com/office/drawing/2010/main" w="9525">
                   <a:solidFill>
                     <a:srgbClr val="000000"/>
                   </a:solidFill>
@@ -3306,7 +3306,7 @@
             </a:ln>
             <a:extLst>
               <a:ext uri="{91240B29-F687-4f45-9708-019B960494DF}">
-                <a14:hiddenLine xmlns:a14="http://schemas.microsoft.com/office/drawing/2010/main" xmlns="" w="9525">
+                <a14:hiddenLine xmlns="" xmlns:a14="http://schemas.microsoft.com/office/drawing/2010/main" w="9525">
                   <a:solidFill>
                     <a:srgbClr val="000000"/>
                   </a:solidFill>
@@ -3396,7 +3396,7 @@
             </a:ln>
             <a:extLst>
               <a:ext uri="{91240B29-F687-4f45-9708-019B960494DF}">
-                <a14:hiddenLine xmlns:a14="http://schemas.microsoft.com/office/drawing/2010/main" xmlns="" w="9525">
+                <a14:hiddenLine xmlns="" xmlns:a14="http://schemas.microsoft.com/office/drawing/2010/main" w="9525">
                   <a:solidFill>
                     <a:srgbClr val="000000"/>
                   </a:solidFill>
@@ -3458,7 +3458,7 @@
             </a:ln>
             <a:extLst>
               <a:ext uri="{91240B29-F687-4f45-9708-019B960494DF}">
-                <a14:hiddenLine xmlns:a14="http://schemas.microsoft.com/office/drawing/2010/main" xmlns="" w="9525">
+                <a14:hiddenLine xmlns="" xmlns:a14="http://schemas.microsoft.com/office/drawing/2010/main" w="9525">
                   <a:solidFill>
                     <a:srgbClr val="000000"/>
                   </a:solidFill>
@@ -3548,7 +3548,7 @@
             </a:ln>
             <a:extLst>
               <a:ext uri="{91240B29-F687-4f45-9708-019B960494DF}">
-                <a14:hiddenLine xmlns:a14="http://schemas.microsoft.com/office/drawing/2010/main" xmlns="" w="9525">
+                <a14:hiddenLine xmlns="" xmlns:a14="http://schemas.microsoft.com/office/drawing/2010/main" w="9525">
                   <a:solidFill>
                     <a:srgbClr val="000000"/>
                   </a:solidFill>
@@ -3638,7 +3638,7 @@
             </a:ln>
             <a:extLst>
               <a:ext uri="{91240B29-F687-4f45-9708-019B960494DF}">
-                <a14:hiddenLine xmlns:a14="http://schemas.microsoft.com/office/drawing/2010/main" xmlns="" w="9525">
+                <a14:hiddenLine xmlns="" xmlns:a14="http://schemas.microsoft.com/office/drawing/2010/main" w="9525">
                   <a:solidFill>
                     <a:srgbClr val="000000"/>
                   </a:solidFill>
@@ -3703,7 +3703,7 @@
             </a:ln>
             <a:extLst>
               <a:ext uri="{91240B29-F687-4f45-9708-019B960494DF}">
-                <a14:hiddenLine xmlns:a14="http://schemas.microsoft.com/office/drawing/2010/main" xmlns="" w="9525">
+                <a14:hiddenLine xmlns="" xmlns:a14="http://schemas.microsoft.com/office/drawing/2010/main" w="9525">
                   <a:solidFill>
                     <a:srgbClr val="000000"/>
                   </a:solidFill>
@@ -3765,7 +3765,7 @@
             </a:ln>
             <a:extLst>
               <a:ext uri="{91240B29-F687-4f45-9708-019B960494DF}">
-                <a14:hiddenLine xmlns:a14="http://schemas.microsoft.com/office/drawing/2010/main" xmlns="" w="9525">
+                <a14:hiddenLine xmlns="" xmlns:a14="http://schemas.microsoft.com/office/drawing/2010/main" w="9525">
                   <a:solidFill>
                     <a:srgbClr val="000000"/>
                   </a:solidFill>
@@ -3855,7 +3855,7 @@
             </a:ln>
             <a:extLst>
               <a:ext uri="{91240B29-F687-4f45-9708-019B960494DF}">
-                <a14:hiddenLine xmlns:a14="http://schemas.microsoft.com/office/drawing/2010/main" xmlns="" w="9525">
+                <a14:hiddenLine xmlns="" xmlns:a14="http://schemas.microsoft.com/office/drawing/2010/main" w="9525">
                   <a:solidFill>
                     <a:srgbClr val="000000"/>
                   </a:solidFill>
@@ -3945,7 +3945,7 @@
             </a:ln>
             <a:extLst>
               <a:ext uri="{91240B29-F687-4f45-9708-019B960494DF}">
-                <a14:hiddenLine xmlns:a14="http://schemas.microsoft.com/office/drawing/2010/main" xmlns="" w="9525">
+                <a14:hiddenLine xmlns="" xmlns:a14="http://schemas.microsoft.com/office/drawing/2010/main" w="9525">
                   <a:solidFill>
                     <a:srgbClr val="000000"/>
                   </a:solidFill>
@@ -4007,7 +4007,7 @@
             </a:ln>
             <a:extLst>
               <a:ext uri="{91240B29-F687-4f45-9708-019B960494DF}">
-                <a14:hiddenLine xmlns:a14="http://schemas.microsoft.com/office/drawing/2010/main" xmlns="" w="9525">
+                <a14:hiddenLine xmlns="" xmlns:a14="http://schemas.microsoft.com/office/drawing/2010/main" w="9525">
                   <a:solidFill>
                     <a:srgbClr val="000000"/>
                   </a:solidFill>
@@ -4127,7 +4127,7 @@
             </a:ln>
             <a:extLst>
               <a:ext uri="{91240B29-F687-4f45-9708-019B960494DF}">
-                <a14:hiddenLine xmlns:a14="http://schemas.microsoft.com/office/drawing/2010/main" xmlns="" w="9525">
+                <a14:hiddenLine xmlns="" xmlns:a14="http://schemas.microsoft.com/office/drawing/2010/main" w="9525">
                   <a:solidFill>
                     <a:srgbClr val="000000"/>
                   </a:solidFill>
@@ -4195,7 +4195,7 @@
             </a:ln>
             <a:extLst>
               <a:ext uri="{91240B29-F687-4f45-9708-019B960494DF}">
-                <a14:hiddenLine xmlns:a14="http://schemas.microsoft.com/office/drawing/2010/main" xmlns="" w="9525">
+                <a14:hiddenLine xmlns="" xmlns:a14="http://schemas.microsoft.com/office/drawing/2010/main" w="9525">
                   <a:solidFill>
                     <a:srgbClr val="000000"/>
                   </a:solidFill>
@@ -4285,7 +4285,7 @@
             </a:ln>
             <a:extLst>
               <a:ext uri="{91240B29-F687-4f45-9708-019B960494DF}">
-                <a14:hiddenLine xmlns:a14="http://schemas.microsoft.com/office/drawing/2010/main" xmlns="" w="9525">
+                <a14:hiddenLine xmlns="" xmlns:a14="http://schemas.microsoft.com/office/drawing/2010/main" w="9525">
                   <a:solidFill>
                     <a:srgbClr val="000000"/>
                   </a:solidFill>
@@ -4425,7 +4425,7 @@
           <a:p>
             <a:fld id="{48A87A34-81AB-432B-8DAE-1953F412C126}" type="datetimeFigureOut">
               <a:rPr lang="en-US" dirty="0"/>
-              <a:t>11/23/2019</a:t>
+              <a:t>2/8/2020</a:t>
             </a:fld>
             <a:endParaRPr lang="en-US" dirty="0"/>
           </a:p>
@@ -4687,7 +4687,7 @@
           <a:p>
             <a:fld id="{48A87A34-81AB-432B-8DAE-1953F412C126}" type="datetimeFigureOut">
               <a:rPr lang="en-US" dirty="0"/>
-              <a:t>11/23/2019</a:t>
+              <a:t>2/8/2020</a:t>
             </a:fld>
             <a:endParaRPr lang="en-US" dirty="0"/>
           </a:p>
@@ -4878,7 +4878,7 @@
           <a:p>
             <a:fld id="{48A87A34-81AB-432B-8DAE-1953F412C126}" type="datetimeFigureOut">
               <a:rPr lang="en-US" dirty="0"/>
-              <a:t>11/23/2019</a:t>
+              <a:t>2/8/2020</a:t>
             </a:fld>
             <a:endParaRPr lang="en-US" dirty="0"/>
           </a:p>
@@ -5136,7 +5136,7 @@
           <a:p>
             <a:fld id="{48A87A34-81AB-432B-8DAE-1953F412C126}" type="datetimeFigureOut">
               <a:rPr lang="en-US" dirty="0"/>
-              <a:t>11/23/2019</a:t>
+              <a:t>2/8/2020</a:t>
             </a:fld>
             <a:endParaRPr lang="en-US" dirty="0"/>
           </a:p>
@@ -5565,7 +5565,7 @@
           <a:p>
             <a:fld id="{48A87A34-81AB-432B-8DAE-1953F412C126}" type="datetimeFigureOut">
               <a:rPr lang="en-US" dirty="0"/>
-              <a:t>11/23/2019</a:t>
+              <a:t>2/8/2020</a:t>
             </a:fld>
             <a:endParaRPr lang="en-US" dirty="0"/>
           </a:p>
@@ -6106,7 +6106,7 @@
           <a:p>
             <a:fld id="{48A87A34-81AB-432B-8DAE-1953F412C126}" type="datetimeFigureOut">
               <a:rPr lang="en-US" dirty="0"/>
-              <a:t>11/23/2019</a:t>
+              <a:t>2/8/2020</a:t>
             </a:fld>
             <a:endParaRPr lang="en-US" dirty="0"/>
           </a:p>
@@ -6821,7 +6821,7 @@
           <a:p>
             <a:fld id="{48A87A34-81AB-432B-8DAE-1953F412C126}" type="datetimeFigureOut">
               <a:rPr lang="en-US" dirty="0"/>
-              <a:t>11/23/2019</a:t>
+              <a:t>2/8/2020</a:t>
             </a:fld>
             <a:endParaRPr lang="en-US" dirty="0"/>
           </a:p>
@@ -6986,7 +6986,7 @@
           <a:p>
             <a:fld id="{48A87A34-81AB-432B-8DAE-1953F412C126}" type="datetimeFigureOut">
               <a:rPr lang="en-US" dirty="0"/>
-              <a:t>11/23/2019</a:t>
+              <a:t>2/8/2020</a:t>
             </a:fld>
             <a:endParaRPr lang="en-US" dirty="0"/>
           </a:p>
@@ -7161,7 +7161,7 @@
           <a:p>
             <a:fld id="{48A87A34-81AB-432B-8DAE-1953F412C126}" type="datetimeFigureOut">
               <a:rPr lang="en-US" dirty="0"/>
-              <a:t>11/23/2019</a:t>
+              <a:t>2/8/2020</a:t>
             </a:fld>
             <a:endParaRPr lang="en-US" dirty="0"/>
           </a:p>
@@ -7326,7 +7326,7 @@
           <a:p>
             <a:fld id="{48A87A34-81AB-432B-8DAE-1953F412C126}" type="datetimeFigureOut">
               <a:rPr lang="en-US" dirty="0"/>
-              <a:t>11/23/2019</a:t>
+              <a:t>2/8/2020</a:t>
             </a:fld>
             <a:endParaRPr lang="en-US" dirty="0"/>
           </a:p>
@@ -7571,7 +7571,7 @@
           <a:p>
             <a:fld id="{48A87A34-81AB-432B-8DAE-1953F412C126}" type="datetimeFigureOut">
               <a:rPr lang="en-US" dirty="0"/>
-              <a:t>11/23/2019</a:t>
+              <a:t>2/8/2020</a:t>
             </a:fld>
             <a:endParaRPr lang="en-US" dirty="0"/>
           </a:p>
@@ -7798,7 +7798,7 @@
           <a:p>
             <a:fld id="{48A87A34-81AB-432B-8DAE-1953F412C126}" type="datetimeFigureOut">
               <a:rPr lang="en-US" dirty="0"/>
-              <a:t>11/23/2019</a:t>
+              <a:t>2/8/2020</a:t>
             </a:fld>
             <a:endParaRPr lang="en-US" dirty="0"/>
           </a:p>
@@ -8174,7 +8174,7 @@
           <a:p>
             <a:fld id="{48A87A34-81AB-432B-8DAE-1953F412C126}" type="datetimeFigureOut">
               <a:rPr lang="en-US" dirty="0"/>
-              <a:t>11/23/2019</a:t>
+              <a:t>2/8/2020</a:t>
             </a:fld>
             <a:endParaRPr lang="en-US" dirty="0"/>
           </a:p>
@@ -8287,7 +8287,7 @@
           <a:p>
             <a:fld id="{48A87A34-81AB-432B-8DAE-1953F412C126}" type="datetimeFigureOut">
               <a:rPr lang="en-US" dirty="0"/>
-              <a:t>11/23/2019</a:t>
+              <a:t>2/8/2020</a:t>
             </a:fld>
             <a:endParaRPr lang="en-US" dirty="0"/>
           </a:p>
@@ -8377,7 +8377,7 @@
           <a:p>
             <a:fld id="{48A87A34-81AB-432B-8DAE-1953F412C126}" type="datetimeFigureOut">
               <a:rPr lang="en-US" dirty="0"/>
-              <a:t>11/23/2019</a:t>
+              <a:t>2/8/2020</a:t>
             </a:fld>
             <a:endParaRPr lang="en-US" dirty="0"/>
           </a:p>
@@ -8621,7 +8621,7 @@
           <a:p>
             <a:fld id="{48A87A34-81AB-432B-8DAE-1953F412C126}" type="datetimeFigureOut">
               <a:rPr lang="en-US" dirty="0"/>
-              <a:t>11/23/2019</a:t>
+              <a:t>2/8/2020</a:t>
             </a:fld>
             <a:endParaRPr lang="en-US" dirty="0"/>
           </a:p>
@@ -8896,7 +8896,7 @@
           <a:p>
             <a:fld id="{48A87A34-81AB-432B-8DAE-1953F412C126}" type="datetimeFigureOut">
               <a:rPr lang="en-US" dirty="0"/>
-              <a:t>11/23/2019</a:t>
+              <a:t>2/8/2020</a:t>
             </a:fld>
             <a:endParaRPr lang="en-US" dirty="0"/>
           </a:p>
@@ -9014,7 +9014,7 @@
           <a:noFill/>
           <a:extLst>
             <a:ext uri="{909E8E84-426E-40dd-AFC4-6F175D3DCCD1}">
-              <a14:hiddenFill xmlns:a14="http://schemas.microsoft.com/office/drawing/2010/main" xmlns="">
+              <a14:hiddenFill xmlns="" xmlns:a14="http://schemas.microsoft.com/office/drawing/2010/main">
                 <a:solidFill>
                   <a:srgbClr val="FFFFFF"/>
                 </a:solidFill>
@@ -9088,7 +9088,7 @@
               </a:ln>
               <a:extLst>
                 <a:ext uri="{91240B29-F687-4f45-9708-019B960494DF}">
-                  <a14:hiddenLine xmlns:a14="http://schemas.microsoft.com/office/drawing/2010/main" xmlns="" w="9525">
+                  <a14:hiddenLine xmlns="" xmlns:a14="http://schemas.microsoft.com/office/drawing/2010/main" w="9525">
                     <a:solidFill>
                       <a:srgbClr val="000000"/>
                     </a:solidFill>
@@ -9178,7 +9178,7 @@
               </a:ln>
               <a:extLst>
                 <a:ext uri="{91240B29-F687-4f45-9708-019B960494DF}">
-                  <a14:hiddenLine xmlns:a14="http://schemas.microsoft.com/office/drawing/2010/main" xmlns="" w="9525">
+                  <a14:hiddenLine xmlns="" xmlns:a14="http://schemas.microsoft.com/office/drawing/2010/main" w="9525">
                     <a:solidFill>
                       <a:srgbClr val="000000"/>
                     </a:solidFill>
@@ -9268,7 +9268,7 @@
               </a:ln>
               <a:extLst>
                 <a:ext uri="{91240B29-F687-4f45-9708-019B960494DF}">
-                  <a14:hiddenLine xmlns:a14="http://schemas.microsoft.com/office/drawing/2010/main" xmlns="" w="9525">
+                  <a14:hiddenLine xmlns="" xmlns:a14="http://schemas.microsoft.com/office/drawing/2010/main" w="9525">
                     <a:solidFill>
                       <a:srgbClr val="000000"/>
                     </a:solidFill>
@@ -9330,7 +9330,7 @@
               </a:ln>
               <a:extLst>
                 <a:ext uri="{91240B29-F687-4f45-9708-019B960494DF}">
-                  <a14:hiddenLine xmlns:a14="http://schemas.microsoft.com/office/drawing/2010/main" xmlns="" w="9525">
+                  <a14:hiddenLine xmlns="" xmlns:a14="http://schemas.microsoft.com/office/drawing/2010/main" w="9525">
                     <a:solidFill>
                       <a:srgbClr val="000000"/>
                     </a:solidFill>
@@ -9420,7 +9420,7 @@
               </a:ln>
               <a:extLst>
                 <a:ext uri="{91240B29-F687-4f45-9708-019B960494DF}">
-                  <a14:hiddenLine xmlns:a14="http://schemas.microsoft.com/office/drawing/2010/main" xmlns="" w="9525">
+                  <a14:hiddenLine xmlns="" xmlns:a14="http://schemas.microsoft.com/office/drawing/2010/main" w="9525">
                     <a:solidFill>
                       <a:srgbClr val="000000"/>
                     </a:solidFill>
@@ -9482,7 +9482,7 @@
               </a:ln>
               <a:extLst>
                 <a:ext uri="{91240B29-F687-4f45-9708-019B960494DF}">
-                  <a14:hiddenLine xmlns:a14="http://schemas.microsoft.com/office/drawing/2010/main" xmlns="" w="9525">
+                  <a14:hiddenLine xmlns="" xmlns:a14="http://schemas.microsoft.com/office/drawing/2010/main" w="9525">
                     <a:solidFill>
                       <a:srgbClr val="000000"/>
                     </a:solidFill>
@@ -9544,7 +9544,7 @@
               </a:ln>
               <a:extLst>
                 <a:ext uri="{91240B29-F687-4f45-9708-019B960494DF}">
-                  <a14:hiddenLine xmlns:a14="http://schemas.microsoft.com/office/drawing/2010/main" xmlns="" w="9525">
+                  <a14:hiddenLine xmlns="" xmlns:a14="http://schemas.microsoft.com/office/drawing/2010/main" w="9525">
                     <a:solidFill>
                       <a:srgbClr val="000000"/>
                     </a:solidFill>
@@ -9634,7 +9634,7 @@
               </a:ln>
               <a:extLst>
                 <a:ext uri="{91240B29-F687-4f45-9708-019B960494DF}">
-                  <a14:hiddenLine xmlns:a14="http://schemas.microsoft.com/office/drawing/2010/main" xmlns="" w="9525">
+                  <a14:hiddenLine xmlns="" xmlns:a14="http://schemas.microsoft.com/office/drawing/2010/main" w="9525">
                     <a:solidFill>
                       <a:srgbClr val="000000"/>
                     </a:solidFill>
@@ -9724,7 +9724,7 @@
               </a:ln>
               <a:extLst>
                 <a:ext uri="{91240B29-F687-4f45-9708-019B960494DF}">
-                  <a14:hiddenLine xmlns:a14="http://schemas.microsoft.com/office/drawing/2010/main" xmlns="" w="9525">
+                  <a14:hiddenLine xmlns="" xmlns:a14="http://schemas.microsoft.com/office/drawing/2010/main" w="9525">
                     <a:solidFill>
                       <a:srgbClr val="000000"/>
                     </a:solidFill>
@@ -9786,7 +9786,7 @@
               </a:ln>
               <a:extLst>
                 <a:ext uri="{91240B29-F687-4f45-9708-019B960494DF}">
-                  <a14:hiddenLine xmlns:a14="http://schemas.microsoft.com/office/drawing/2010/main" xmlns="" w="9525">
+                  <a14:hiddenLine xmlns="" xmlns:a14="http://schemas.microsoft.com/office/drawing/2010/main" w="9525">
                     <a:solidFill>
                       <a:srgbClr val="000000"/>
                     </a:solidFill>
@@ -9896,7 +9896,7 @@
               </a:ln>
               <a:extLst>
                 <a:ext uri="{91240B29-F687-4f45-9708-019B960494DF}">
-                  <a14:hiddenLine xmlns:a14="http://schemas.microsoft.com/office/drawing/2010/main" xmlns="" w="9525">
+                  <a14:hiddenLine xmlns="" xmlns:a14="http://schemas.microsoft.com/office/drawing/2010/main" w="9525">
                     <a:solidFill>
                       <a:srgbClr val="000000"/>
                     </a:solidFill>
@@ -9980,7 +9980,7 @@
               </a:ln>
               <a:extLst>
                 <a:ext uri="{91240B29-F687-4f45-9708-019B960494DF}">
-                  <a14:hiddenLine xmlns:a14="http://schemas.microsoft.com/office/drawing/2010/main" xmlns="" w="9525">
+                  <a14:hiddenLine xmlns="" xmlns:a14="http://schemas.microsoft.com/office/drawing/2010/main" w="9525">
                     <a:solidFill>
                       <a:srgbClr val="000000"/>
                     </a:solidFill>
@@ -10042,7 +10042,7 @@
               </a:ln>
               <a:extLst>
                 <a:ext uri="{91240B29-F687-4f45-9708-019B960494DF}">
-                  <a14:hiddenLine xmlns:a14="http://schemas.microsoft.com/office/drawing/2010/main" xmlns="" w="9525">
+                  <a14:hiddenLine xmlns="" xmlns:a14="http://schemas.microsoft.com/office/drawing/2010/main" w="9525">
                     <a:solidFill>
                       <a:srgbClr val="000000"/>
                     </a:solidFill>
@@ -10104,7 +10104,7 @@
               </a:ln>
               <a:extLst>
                 <a:ext uri="{91240B29-F687-4f45-9708-019B960494DF}">
-                  <a14:hiddenLine xmlns:a14="http://schemas.microsoft.com/office/drawing/2010/main" xmlns="" w="9525">
+                  <a14:hiddenLine xmlns="" xmlns:a14="http://schemas.microsoft.com/office/drawing/2010/main" w="9525">
                     <a:solidFill>
                       <a:srgbClr val="000000"/>
                     </a:solidFill>
@@ -10194,7 +10194,7 @@
               </a:ln>
               <a:extLst>
                 <a:ext uri="{91240B29-F687-4f45-9708-019B960494DF}">
-                  <a14:hiddenLine xmlns:a14="http://schemas.microsoft.com/office/drawing/2010/main" xmlns="" w="9525">
+                  <a14:hiddenLine xmlns="" xmlns:a14="http://schemas.microsoft.com/office/drawing/2010/main" w="9525">
                     <a:solidFill>
                       <a:srgbClr val="000000"/>
                     </a:solidFill>
@@ -10228,7 +10228,7 @@
               </a:ln>
               <a:extLst>
                 <a:ext uri="{91240B29-F687-4f45-9708-019B960494DF}">
-                  <a14:hiddenLine xmlns:a14="http://schemas.microsoft.com/office/drawing/2010/main" xmlns="" w="9525">
+                  <a14:hiddenLine xmlns="" xmlns:a14="http://schemas.microsoft.com/office/drawing/2010/main" w="9525">
                     <a:solidFill>
                       <a:srgbClr val="000000"/>
                     </a:solidFill>
@@ -10293,7 +10293,7 @@
               </a:ln>
               <a:extLst>
                 <a:ext uri="{91240B29-F687-4f45-9708-019B960494DF}">
-                  <a14:hiddenLine xmlns:a14="http://schemas.microsoft.com/office/drawing/2010/main" xmlns="" w="9525">
+                  <a14:hiddenLine xmlns="" xmlns:a14="http://schemas.microsoft.com/office/drawing/2010/main" w="9525">
                     <a:solidFill>
                       <a:srgbClr val="000000"/>
                     </a:solidFill>
@@ -10383,7 +10383,7 @@
               </a:ln>
               <a:extLst>
                 <a:ext uri="{91240B29-F687-4f45-9708-019B960494DF}">
-                  <a14:hiddenLine xmlns:a14="http://schemas.microsoft.com/office/drawing/2010/main" xmlns="" w="9525">
+                  <a14:hiddenLine xmlns="" xmlns:a14="http://schemas.microsoft.com/office/drawing/2010/main" w="9525">
                     <a:solidFill>
                       <a:srgbClr val="000000"/>
                     </a:solidFill>
@@ -10445,7 +10445,7 @@
               </a:ln>
               <a:extLst>
                 <a:ext uri="{91240B29-F687-4f45-9708-019B960494DF}">
-                  <a14:hiddenLine xmlns:a14="http://schemas.microsoft.com/office/drawing/2010/main" xmlns="" w="9525">
+                  <a14:hiddenLine xmlns="" xmlns:a14="http://schemas.microsoft.com/office/drawing/2010/main" w="9525">
                     <a:solidFill>
                       <a:srgbClr val="000000"/>
                     </a:solidFill>
@@ -10535,7 +10535,7 @@
               </a:ln>
               <a:extLst>
                 <a:ext uri="{91240B29-F687-4f45-9708-019B960494DF}">
-                  <a14:hiddenLine xmlns:a14="http://schemas.microsoft.com/office/drawing/2010/main" xmlns="" w="9525">
+                  <a14:hiddenLine xmlns="" xmlns:a14="http://schemas.microsoft.com/office/drawing/2010/main" w="9525">
                     <a:solidFill>
                       <a:srgbClr val="000000"/>
                     </a:solidFill>
@@ -10600,7 +10600,7 @@
               </a:ln>
               <a:extLst>
                 <a:ext uri="{91240B29-F687-4f45-9708-019B960494DF}">
-                  <a14:hiddenLine xmlns:a14="http://schemas.microsoft.com/office/drawing/2010/main" xmlns="" w="9525">
+                  <a14:hiddenLine xmlns="" xmlns:a14="http://schemas.microsoft.com/office/drawing/2010/main" w="9525">
                     <a:solidFill>
                       <a:srgbClr val="000000"/>
                     </a:solidFill>
@@ -10662,7 +10662,7 @@
               </a:ln>
               <a:extLst>
                 <a:ext uri="{91240B29-F687-4f45-9708-019B960494DF}">
-                  <a14:hiddenLine xmlns:a14="http://schemas.microsoft.com/office/drawing/2010/main" xmlns="" w="9525">
+                  <a14:hiddenLine xmlns="" xmlns:a14="http://schemas.microsoft.com/office/drawing/2010/main" w="9525">
                     <a:solidFill>
                       <a:srgbClr val="000000"/>
                     </a:solidFill>
@@ -10752,7 +10752,7 @@
               </a:ln>
               <a:extLst>
                 <a:ext uri="{91240B29-F687-4f45-9708-019B960494DF}">
-                  <a14:hiddenLine xmlns:a14="http://schemas.microsoft.com/office/drawing/2010/main" xmlns="" w="9525">
+                  <a14:hiddenLine xmlns="" xmlns:a14="http://schemas.microsoft.com/office/drawing/2010/main" w="9525">
                     <a:solidFill>
                       <a:srgbClr val="000000"/>
                     </a:solidFill>
@@ -10842,7 +10842,7 @@
               </a:ln>
               <a:extLst>
                 <a:ext uri="{91240B29-F687-4f45-9708-019B960494DF}">
-                  <a14:hiddenLine xmlns:a14="http://schemas.microsoft.com/office/drawing/2010/main" xmlns="" w="9525">
+                  <a14:hiddenLine xmlns="" xmlns:a14="http://schemas.microsoft.com/office/drawing/2010/main" w="9525">
                     <a:solidFill>
                       <a:srgbClr val="000000"/>
                     </a:solidFill>
@@ -10907,7 +10907,7 @@
               </a:ln>
               <a:extLst>
                 <a:ext uri="{91240B29-F687-4f45-9708-019B960494DF}">
-                  <a14:hiddenLine xmlns:a14="http://schemas.microsoft.com/office/drawing/2010/main" xmlns="" w="9525">
+                  <a14:hiddenLine xmlns="" xmlns:a14="http://schemas.microsoft.com/office/drawing/2010/main" w="9525">
                     <a:solidFill>
                       <a:srgbClr val="000000"/>
                     </a:solidFill>
@@ -11027,7 +11027,7 @@
               </a:ln>
               <a:extLst>
                 <a:ext uri="{91240B29-F687-4f45-9708-019B960494DF}">
-                  <a14:hiddenLine xmlns:a14="http://schemas.microsoft.com/office/drawing/2010/main" xmlns="" w="9525">
+                  <a14:hiddenLine xmlns="" xmlns:a14="http://schemas.microsoft.com/office/drawing/2010/main" w="9525">
                     <a:solidFill>
                       <a:srgbClr val="000000"/>
                     </a:solidFill>
@@ -11108,7 +11108,7 @@
               </a:ln>
               <a:extLst>
                 <a:ext uri="{91240B29-F687-4f45-9708-019B960494DF}">
-                  <a14:hiddenLine xmlns:a14="http://schemas.microsoft.com/office/drawing/2010/main" xmlns="" w="9525">
+                  <a14:hiddenLine xmlns="" xmlns:a14="http://schemas.microsoft.com/office/drawing/2010/main" w="9525">
                     <a:solidFill>
                       <a:srgbClr val="000000"/>
                     </a:solidFill>
@@ -11223,7 +11223,7 @@
               </a:ln>
               <a:extLst>
                 <a:ext uri="{91240B29-F687-4f45-9708-019B960494DF}">
-                  <a14:hiddenLine xmlns:a14="http://schemas.microsoft.com/office/drawing/2010/main" xmlns="" w="9525">
+                  <a14:hiddenLine xmlns="" xmlns:a14="http://schemas.microsoft.com/office/drawing/2010/main" w="9525">
                     <a:solidFill>
                       <a:srgbClr val="000000"/>
                     </a:solidFill>
@@ -11313,7 +11313,7 @@
               </a:ln>
               <a:extLst>
                 <a:ext uri="{91240B29-F687-4f45-9708-019B960494DF}">
-                  <a14:hiddenLine xmlns:a14="http://schemas.microsoft.com/office/drawing/2010/main" xmlns="" w="9525">
+                  <a14:hiddenLine xmlns="" xmlns:a14="http://schemas.microsoft.com/office/drawing/2010/main" w="9525">
                     <a:solidFill>
                       <a:srgbClr val="000000"/>
                     </a:solidFill>
@@ -11378,7 +11378,7 @@
               </a:ln>
               <a:extLst>
                 <a:ext uri="{91240B29-F687-4f45-9708-019B960494DF}">
-                  <a14:hiddenLine xmlns:a14="http://schemas.microsoft.com/office/drawing/2010/main" xmlns="" w="9525">
+                  <a14:hiddenLine xmlns="" xmlns:a14="http://schemas.microsoft.com/office/drawing/2010/main" w="9525">
                     <a:solidFill>
                       <a:srgbClr val="000000"/>
                     </a:solidFill>
@@ -11468,7 +11468,7 @@
               </a:ln>
               <a:extLst>
                 <a:ext uri="{91240B29-F687-4f45-9708-019B960494DF}">
-                  <a14:hiddenLine xmlns:a14="http://schemas.microsoft.com/office/drawing/2010/main" xmlns="" w="9525">
+                  <a14:hiddenLine xmlns="" xmlns:a14="http://schemas.microsoft.com/office/drawing/2010/main" w="9525">
                     <a:solidFill>
                       <a:srgbClr val="000000"/>
                     </a:solidFill>
@@ -11536,7 +11536,7 @@
               </a:ln>
               <a:extLst>
                 <a:ext uri="{91240B29-F687-4f45-9708-019B960494DF}">
-                  <a14:hiddenLine xmlns:a14="http://schemas.microsoft.com/office/drawing/2010/main" xmlns="" w="9525">
+                  <a14:hiddenLine xmlns="" xmlns:a14="http://schemas.microsoft.com/office/drawing/2010/main" w="9525">
                     <a:solidFill>
                       <a:srgbClr val="000000"/>
                     </a:solidFill>
@@ -11626,7 +11626,7 @@
               </a:ln>
               <a:extLst>
                 <a:ext uri="{91240B29-F687-4f45-9708-019B960494DF}">
-                  <a14:hiddenLine xmlns:a14="http://schemas.microsoft.com/office/drawing/2010/main" xmlns="" w="9525">
+                  <a14:hiddenLine xmlns="" xmlns:a14="http://schemas.microsoft.com/office/drawing/2010/main" w="9525">
                     <a:solidFill>
                       <a:srgbClr val="000000"/>
                     </a:solidFill>
@@ -11694,7 +11694,7 @@
               </a:ln>
               <a:extLst>
                 <a:ext uri="{91240B29-F687-4f45-9708-019B960494DF}">
-                  <a14:hiddenLine xmlns:a14="http://schemas.microsoft.com/office/drawing/2010/main" xmlns="" w="9525">
+                  <a14:hiddenLine xmlns="" xmlns:a14="http://schemas.microsoft.com/office/drawing/2010/main" w="9525">
                     <a:solidFill>
                       <a:srgbClr val="000000"/>
                     </a:solidFill>
@@ -11784,7 +11784,7 @@
               </a:ln>
               <a:extLst>
                 <a:ext uri="{91240B29-F687-4f45-9708-019B960494DF}">
-                  <a14:hiddenLine xmlns:a14="http://schemas.microsoft.com/office/drawing/2010/main" xmlns="" w="9525">
+                  <a14:hiddenLine xmlns="" xmlns:a14="http://schemas.microsoft.com/office/drawing/2010/main" w="9525">
                     <a:solidFill>
                       <a:srgbClr val="000000"/>
                     </a:solidFill>
@@ -11818,7 +11818,7 @@
               </a:ln>
               <a:extLst>
                 <a:ext uri="{91240B29-F687-4f45-9708-019B960494DF}">
-                  <a14:hiddenLine xmlns:a14="http://schemas.microsoft.com/office/drawing/2010/main" xmlns="" w="9525">
+                  <a14:hiddenLine xmlns="" xmlns:a14="http://schemas.microsoft.com/office/drawing/2010/main" w="9525">
                     <a:solidFill>
                       <a:srgbClr val="000000"/>
                     </a:solidFill>
@@ -11959,7 +11959,7 @@
             <a:fld id="{48A87A34-81AB-432B-8DAE-1953F412C126}" type="datetimeFigureOut">
               <a:rPr lang="en-US" dirty="0"/>
               <a:pPr/>
-              <a:t>11/23/2019</a:t>
+              <a:t>2/8/2020</a:t>
             </a:fld>
             <a:endParaRPr lang="en-US" dirty="0"/>
           </a:p>
@@ -12379,7 +12379,6 @@
                 <a:lumMod val="90000"/>
               </a:schemeClr>
             </a:duotone>
-            <a:extLst/>
           </a:blip>
           <a:stretch/>
         </a:blipFill>
@@ -12544,7 +12543,7 @@
             <a:noFill/>
             <a:extLst>
               <a:ext uri="{909E8E84-426E-40dd-AFC4-6F175D3DCCD1}">
-                <a14:hiddenFill xmlns="" xmlns:a16="http://schemas.microsoft.com/office/drawing/2014/main" xmlns:a14="http://schemas.microsoft.com/office/drawing/2010/main" xmlns:p14="http://schemas.microsoft.com/office/powerpoint/2010/main">
+                <a14:hiddenFill xmlns:p14="http://schemas.microsoft.com/office/powerpoint/2010/main" xmlns:a14="http://schemas.microsoft.com/office/drawing/2010/main" xmlns:a16="http://schemas.microsoft.com/office/drawing/2014/main" xmlns="">
                   <a:solidFill>
                     <a:srgbClr val="FFFFFF"/>
                   </a:solidFill>
@@ -16655,7 +16654,6 @@
                 <a:lumMod val="90000"/>
               </a:schemeClr>
             </a:duotone>
-            <a:extLst/>
           </a:blip>
           <a:stretch/>
         </a:blipFill>
@@ -17068,7 +17066,7 @@
             </a:pPr>
             <a:r>
               <a:rPr lang="en-PH" sz="1600" dirty="0"/>
-              <a:t>Classes and Objects</a:t>
+              <a:t>Classes and Attributes</a:t>
             </a:r>
           </a:p>
           <a:p>
@@ -17107,30 +17105,33 @@
               <a:buChar char="•"/>
             </a:pPr>
             <a:r>
-              <a:rPr lang="en-PH" sz="1600" dirty="0" err="1"/>
-              <a:t>Enums</a:t>
-            </a:r>
-            <a:endParaRPr lang="en-PH" sz="1600" dirty="0"/>
-          </a:p>
-          <a:p>
-            <a:pPr marL="1257300" lvl="2" indent="-342900" algn="l">
+              <a:rPr lang="en-PH" sz="1600" dirty="0"/>
+              <a:t>Program Flow</a:t>
+            </a:r>
+          </a:p>
+          <a:p>
+            <a:pPr marL="1714500" lvl="3" indent="-342900" algn="l">
               <a:buFont typeface="Arial" panose="020B0604020202020204" pitchFamily="34" charset="0"/>
               <a:buChar char="•"/>
             </a:pPr>
             <a:r>
-              <a:rPr lang="en-PH" sz="1600" dirty="0"/>
-              <a:t>Delegates</a:t>
-            </a:r>
-          </a:p>
-          <a:p>
-            <a:pPr marL="1257300" lvl="2" indent="-342900" algn="l">
+              <a:rPr lang="en-PH" sz="1400" dirty="0"/>
+              <a:t>Loops</a:t>
+            </a:r>
+          </a:p>
+          <a:p>
+            <a:pPr marL="1714500" lvl="3" indent="-342900" algn="l">
               <a:buFont typeface="Arial" panose="020B0604020202020204" pitchFamily="34" charset="0"/>
               <a:buChar char="•"/>
             </a:pPr>
             <a:r>
-              <a:rPr lang="en-PH" sz="1600" dirty="0"/>
-              <a:t>Attributes</a:t>
-            </a:r>
+              <a:rPr lang="en-PH" sz="1400" dirty="0"/>
+              <a:t>Switches</a:t>
+            </a:r>
+          </a:p>
+          <a:p>
+            <a:pPr lvl="2" algn="l"/>
+            <a:endParaRPr lang="en-PH" sz="1600" dirty="0"/>
           </a:p>
           <a:p>
             <a:pPr marL="1257300" lvl="2" indent="-342900" algn="l">
@@ -17210,7 +17211,6 @@
                 <a:lumMod val="90000"/>
               </a:schemeClr>
             </a:duotone>
-            <a:extLst/>
           </a:blip>
           <a:stretch/>
         </a:blipFill>
@@ -17375,7 +17375,7 @@
             <a:noFill/>
             <a:extLst>
               <a:ext uri="{909E8E84-426E-40dd-AFC4-6F175D3DCCD1}">
-                <a14:hiddenFill xmlns="" xmlns:a16="http://schemas.microsoft.com/office/drawing/2014/main" xmlns:a14="http://schemas.microsoft.com/office/drawing/2010/main" xmlns:p14="http://schemas.microsoft.com/office/powerpoint/2010/main">
+                <a14:hiddenFill xmlns:p14="http://schemas.microsoft.com/office/powerpoint/2010/main" xmlns:a14="http://schemas.microsoft.com/office/drawing/2010/main" xmlns:a16="http://schemas.microsoft.com/office/drawing/2014/main" xmlns="">
                   <a:solidFill>
                     <a:srgbClr val="FFFFFF"/>
                   </a:solidFill>
@@ -21353,7 +21353,6 @@
                 <a:lumMod val="90000"/>
               </a:schemeClr>
             </a:duotone>
-            <a:extLst/>
           </a:blip>
           <a:stretch/>
         </a:blipFill>
@@ -21518,7 +21517,7 @@
             <a:noFill/>
             <a:extLst>
               <a:ext uri="{909E8E84-426E-40dd-AFC4-6F175D3DCCD1}">
-                <a14:hiddenFill xmlns="" xmlns:a16="http://schemas.microsoft.com/office/drawing/2014/main" xmlns:a14="http://schemas.microsoft.com/office/drawing/2010/main" xmlns:p14="http://schemas.microsoft.com/office/powerpoint/2010/main">
+                <a14:hiddenFill xmlns:p14="http://schemas.microsoft.com/office/powerpoint/2010/main" xmlns:a14="http://schemas.microsoft.com/office/drawing/2010/main" xmlns:a16="http://schemas.microsoft.com/office/drawing/2014/main" xmlns="">
                   <a:solidFill>
                     <a:srgbClr val="FFFFFF"/>
                   </a:solidFill>
@@ -24524,7 +24523,6 @@
                 <a:lumMod val="90000"/>
               </a:schemeClr>
             </a:duotone>
-            <a:extLst/>
           </a:blip>
           <a:stretch/>
         </a:blipFill>
@@ -24689,7 +24687,7 @@
             <a:noFill/>
             <a:extLst>
               <a:ext uri="{909E8E84-426E-40dd-AFC4-6F175D3DCCD1}">
-                <a14:hiddenFill xmlns="" xmlns:a16="http://schemas.microsoft.com/office/drawing/2014/main" xmlns:a14="http://schemas.microsoft.com/office/drawing/2010/main" xmlns:p14="http://schemas.microsoft.com/office/powerpoint/2010/main">
+                <a14:hiddenFill xmlns:p14="http://schemas.microsoft.com/office/powerpoint/2010/main" xmlns:a14="http://schemas.microsoft.com/office/drawing/2010/main" xmlns:a16="http://schemas.microsoft.com/office/drawing/2014/main" xmlns="">
                   <a:solidFill>
                     <a:srgbClr val="FFFFFF"/>
                   </a:solidFill>

</xml_diff>